<commit_message>
Added examples in the PowerPoint
</commit_message>
<xml_diff>
--- a/Lesson 1 - Introduction to CTFs/LSB Steganography.pptx
+++ b/Lesson 1 - Introduction to CTFs/LSB Steganography.pptx
@@ -13,8 +13,10 @@
     <p:sldId id="261" r:id="rId7"/>
     <p:sldId id="262" r:id="rId8"/>
     <p:sldId id="265" r:id="rId9"/>
-    <p:sldId id="263" r:id="rId10"/>
-    <p:sldId id="264" r:id="rId11"/>
+    <p:sldId id="266" r:id="rId10"/>
+    <p:sldId id="268" r:id="rId11"/>
+    <p:sldId id="263" r:id="rId12"/>
+    <p:sldId id="264" r:id="rId13"/>
   </p:sldIdLst>
   <p:sldSz cx="12192000" cy="6858000"/>
   <p:notesSz cx="6858000" cy="9144000"/>
@@ -113,6 +115,11 @@
       </a:defRPr>
     </a:lvl9pPr>
   </p:defaultTextStyle>
+  <p:extLst>
+    <p:ext uri="{EFAFB233-063F-42B5-8137-9DF3F51BA10A}">
+      <p15:sldGuideLst xmlns:p15="http://schemas.microsoft.com/office/powerpoint/2012/main"/>
+    </p:ext>
+  </p:extLst>
 </p:presentation>
 </file>
 
@@ -329,7 +336,7 @@
           <a:p>
             <a:fld id="{735EE5BE-2D5B-4B9F-B5A4-D4CCF6B67856}" type="datetimeFigureOut">
               <a:rPr lang="en-US" smtClean="0"/>
-              <a:t>4/28/2021</a:t>
+              <a:t>5/11/2021</a:t>
             </a:fld>
             <a:endParaRPr lang="en-US"/>
           </a:p>
@@ -620,7 +627,7 @@
           <a:p>
             <a:fld id="{735EE5BE-2D5B-4B9F-B5A4-D4CCF6B67856}" type="datetimeFigureOut">
               <a:rPr lang="en-US" smtClean="0"/>
-              <a:t>4/28/2021</a:t>
+              <a:t>5/11/2021</a:t>
             </a:fld>
             <a:endParaRPr lang="en-US"/>
           </a:p>
@@ -879,7 +886,7 @@
           <a:p>
             <a:fld id="{735EE5BE-2D5B-4B9F-B5A4-D4CCF6B67856}" type="datetimeFigureOut">
               <a:rPr lang="en-US" smtClean="0"/>
-              <a:t>4/28/2021</a:t>
+              <a:t>5/11/2021</a:t>
             </a:fld>
             <a:endParaRPr lang="en-US"/>
           </a:p>
@@ -1348,7 +1355,7 @@
           <a:p>
             <a:fld id="{735EE5BE-2D5B-4B9F-B5A4-D4CCF6B67856}" type="datetimeFigureOut">
               <a:rPr lang="en-US" smtClean="0"/>
-              <a:t>4/28/2021</a:t>
+              <a:t>5/11/2021</a:t>
             </a:fld>
             <a:endParaRPr lang="en-US"/>
           </a:p>
@@ -1528,7 +1535,7 @@
           <a:p>
             <a:fld id="{735EE5BE-2D5B-4B9F-B5A4-D4CCF6B67856}" type="datetimeFigureOut">
               <a:rPr lang="en-US" smtClean="0"/>
-              <a:t>4/28/2021</a:t>
+              <a:t>5/11/2021</a:t>
             </a:fld>
             <a:endParaRPr lang="en-US"/>
           </a:p>
@@ -2104,7 +2111,7 @@
           <a:p>
             <a:fld id="{735EE5BE-2D5B-4B9F-B5A4-D4CCF6B67856}" type="datetimeFigureOut">
               <a:rPr lang="en-US" smtClean="0"/>
-              <a:t>4/28/2021</a:t>
+              <a:t>5/11/2021</a:t>
             </a:fld>
             <a:endParaRPr lang="en-US"/>
           </a:p>
@@ -2436,7 +2443,7 @@
           <a:p>
             <a:fld id="{735EE5BE-2D5B-4B9F-B5A4-D4CCF6B67856}" type="datetimeFigureOut">
               <a:rPr lang="en-US" smtClean="0"/>
-              <a:t>4/28/2021</a:t>
+              <a:t>5/11/2021</a:t>
             </a:fld>
             <a:endParaRPr lang="en-US"/>
           </a:p>
@@ -2611,7 +2618,7 @@
           <a:p>
             <a:fld id="{735EE5BE-2D5B-4B9F-B5A4-D4CCF6B67856}" type="datetimeFigureOut">
               <a:rPr lang="en-US" smtClean="0"/>
-              <a:t>4/28/2021</a:t>
+              <a:t>5/11/2021</a:t>
             </a:fld>
             <a:endParaRPr lang="en-US"/>
           </a:p>
@@ -2791,7 +2798,7 @@
           <a:p>
             <a:fld id="{735EE5BE-2D5B-4B9F-B5A4-D4CCF6B67856}" type="datetimeFigureOut">
               <a:rPr lang="en-US" smtClean="0"/>
-              <a:t>4/28/2021</a:t>
+              <a:t>5/11/2021</a:t>
             </a:fld>
             <a:endParaRPr lang="en-US"/>
           </a:p>
@@ -2961,7 +2968,7 @@
           <a:p>
             <a:fld id="{735EE5BE-2D5B-4B9F-B5A4-D4CCF6B67856}" type="datetimeFigureOut">
               <a:rPr lang="en-US" smtClean="0"/>
-              <a:t>4/28/2021</a:t>
+              <a:t>5/11/2021</a:t>
             </a:fld>
             <a:endParaRPr lang="en-US"/>
           </a:p>
@@ -3218,7 +3225,7 @@
           <a:p>
             <a:fld id="{735EE5BE-2D5B-4B9F-B5A4-D4CCF6B67856}" type="datetimeFigureOut">
               <a:rPr lang="en-US" smtClean="0"/>
-              <a:t>4/28/2021</a:t>
+              <a:t>5/11/2021</a:t>
             </a:fld>
             <a:endParaRPr lang="en-US"/>
           </a:p>
@@ -3510,7 +3517,7 @@
           <a:p>
             <a:fld id="{735EE5BE-2D5B-4B9F-B5A4-D4CCF6B67856}" type="datetimeFigureOut">
               <a:rPr lang="en-US" smtClean="0"/>
-              <a:t>4/28/2021</a:t>
+              <a:t>5/11/2021</a:t>
             </a:fld>
             <a:endParaRPr lang="en-US"/>
           </a:p>
@@ -3940,7 +3947,7 @@
           <a:p>
             <a:fld id="{735EE5BE-2D5B-4B9F-B5A4-D4CCF6B67856}" type="datetimeFigureOut">
               <a:rPr lang="en-US" smtClean="0"/>
-              <a:t>4/28/2021</a:t>
+              <a:t>5/11/2021</a:t>
             </a:fld>
             <a:endParaRPr lang="en-US"/>
           </a:p>
@@ -4058,7 +4065,7 @@
           <a:p>
             <a:fld id="{735EE5BE-2D5B-4B9F-B5A4-D4CCF6B67856}" type="datetimeFigureOut">
               <a:rPr lang="en-US" smtClean="0"/>
-              <a:t>4/28/2021</a:t>
+              <a:t>5/11/2021</a:t>
             </a:fld>
             <a:endParaRPr lang="en-US"/>
           </a:p>
@@ -4153,7 +4160,7 @@
           <a:p>
             <a:fld id="{735EE5BE-2D5B-4B9F-B5A4-D4CCF6B67856}" type="datetimeFigureOut">
               <a:rPr lang="en-US" smtClean="0"/>
-              <a:t>4/28/2021</a:t>
+              <a:t>5/11/2021</a:t>
             </a:fld>
             <a:endParaRPr lang="en-US"/>
           </a:p>
@@ -4436,7 +4443,7 @@
           <a:p>
             <a:fld id="{735EE5BE-2D5B-4B9F-B5A4-D4CCF6B67856}" type="datetimeFigureOut">
               <a:rPr lang="en-US" smtClean="0"/>
-              <a:t>4/28/2021</a:t>
+              <a:t>5/11/2021</a:t>
             </a:fld>
             <a:endParaRPr lang="en-US"/>
           </a:p>
@@ -4727,7 +4734,7 @@
           <a:p>
             <a:fld id="{735EE5BE-2D5B-4B9F-B5A4-D4CCF6B67856}" type="datetimeFigureOut">
               <a:rPr lang="en-US" smtClean="0"/>
-              <a:t>4/28/2021</a:t>
+              <a:t>5/11/2021</a:t>
             </a:fld>
             <a:endParaRPr lang="en-US"/>
           </a:p>
@@ -4958,7 +4965,7 @@
           <a:p>
             <a:fld id="{735EE5BE-2D5B-4B9F-B5A4-D4CCF6B67856}" type="datetimeFigureOut">
               <a:rPr lang="en-US" smtClean="0"/>
-              <a:t>4/28/2021</a:t>
+              <a:t>5/11/2021</a:t>
             </a:fld>
             <a:endParaRPr lang="en-US"/>
           </a:p>
@@ -5815,6 +5822,231 @@
       </p:grpSpPr>
       <p:sp>
         <p:nvSpPr>
+          <p:cNvPr id="8" name="Title 7">
+            <a:extLst>
+              <a:ext uri="{FF2B5EF4-FFF2-40B4-BE49-F238E27FC236}">
+                <a16:creationId xmlns:a16="http://schemas.microsoft.com/office/drawing/2014/main" id="{9EC85EB6-198B-4555-928E-F07D08066D6C}"/>
+              </a:ext>
+            </a:extLst>
+          </p:cNvPr>
+          <p:cNvSpPr>
+            <a:spLocks noGrp="1"/>
+          </p:cNvSpPr>
+          <p:nvPr>
+            <p:ph type="title"/>
+          </p:nvPr>
+        </p:nvSpPr>
+        <p:spPr/>
+        <p:txBody>
+          <a:bodyPr/>
+          <a:lstStyle/>
+          <a:p>
+            <a:r>
+              <a:rPr lang="en-US" dirty="0"/>
+              <a:t>Before lsb data encoding</a:t>
+            </a:r>
+          </a:p>
+        </p:txBody>
+      </p:sp>
+      <p:pic>
+        <p:nvPicPr>
+          <p:cNvPr id="18" name="Content Placeholder 17" descr="Table&#10;&#10;Description automatically generated">
+            <a:extLst>
+              <a:ext uri="{FF2B5EF4-FFF2-40B4-BE49-F238E27FC236}">
+                <a16:creationId xmlns:a16="http://schemas.microsoft.com/office/drawing/2014/main" id="{48D1C883-4B36-4FF3-B553-A448415993A8}"/>
+              </a:ext>
+            </a:extLst>
+          </p:cNvPr>
+          <p:cNvPicPr>
+            <a:picLocks noGrp="1" noChangeAspect="1"/>
+          </p:cNvPicPr>
+          <p:nvPr>
+            <p:ph sz="half" idx="2"/>
+          </p:nvPr>
+        </p:nvPicPr>
+        <p:blipFill rotWithShape="1">
+          <a:blip r:embed="rId2">
+            <a:extLst>
+              <a:ext uri="{28A0092B-C50C-407E-A947-70E740481C1C}">
+                <a14:useLocalDpi xmlns:a14="http://schemas.microsoft.com/office/drawing/2010/main" val="0"/>
+              </a:ext>
+            </a:extLst>
+          </a:blip>
+          <a:srcRect l="3278" r="5528"/>
+          <a:stretch/>
+        </p:blipFill>
+        <p:spPr>
+          <a:xfrm>
+            <a:off x="7268546" y="1721498"/>
+            <a:ext cx="4748316" cy="3360577"/>
+          </a:xfrm>
+        </p:spPr>
+      </p:pic>
+      <p:pic>
+        <p:nvPicPr>
+          <p:cNvPr id="13" name="Content Placeholder 12" descr="A city skyline at night&#10;&#10;Description automatically generated with medium confidence">
+            <a:extLst>
+              <a:ext uri="{FF2B5EF4-FFF2-40B4-BE49-F238E27FC236}">
+                <a16:creationId xmlns:a16="http://schemas.microsoft.com/office/drawing/2014/main" id="{2D404C7F-EFE2-48E4-9D98-55A1CB7D1EA0}"/>
+              </a:ext>
+            </a:extLst>
+          </p:cNvPr>
+          <p:cNvPicPr>
+            <a:picLocks noGrp="1" noChangeAspect="1"/>
+          </p:cNvPicPr>
+          <p:nvPr>
+            <p:ph sz="half" idx="1"/>
+          </p:nvPr>
+        </p:nvPicPr>
+        <p:blipFill>
+          <a:blip r:embed="rId3">
+            <a:extLst>
+              <a:ext uri="{28A0092B-C50C-407E-A947-70E740481C1C}">
+                <a14:useLocalDpi xmlns:a14="http://schemas.microsoft.com/office/drawing/2010/main" val="0"/>
+              </a:ext>
+            </a:extLst>
+          </a:blip>
+          <a:stretch>
+            <a:fillRect/>
+          </a:stretch>
+        </p:blipFill>
+        <p:spPr>
+          <a:xfrm>
+            <a:off x="290039" y="2920483"/>
+            <a:ext cx="6730556" cy="2547256"/>
+          </a:xfrm>
+        </p:spPr>
+      </p:pic>
+    </p:spTree>
+    <p:extLst>
+      <p:ext uri="{BB962C8B-B14F-4D97-AF65-F5344CB8AC3E}">
+        <p14:creationId xmlns:p14="http://schemas.microsoft.com/office/powerpoint/2010/main" val="443058434"/>
+      </p:ext>
+    </p:extLst>
+  </p:cSld>
+  <p:clrMapOvr>
+    <a:masterClrMapping/>
+  </p:clrMapOvr>
+</p:sld>
+</file>
+
+<file path=ppt/slides/slide11.xml><?xml version="1.0" encoding="utf-8"?>
+<p:sld xmlns:a="http://schemas.openxmlformats.org/drawingml/2006/main" xmlns:r="http://schemas.openxmlformats.org/officeDocument/2006/relationships" xmlns:p="http://schemas.openxmlformats.org/presentationml/2006/main">
+  <p:cSld>
+    <p:spTree>
+      <p:nvGrpSpPr>
+        <p:cNvPr id="1" name=""/>
+        <p:cNvGrpSpPr/>
+        <p:nvPr/>
+      </p:nvGrpSpPr>
+      <p:grpSpPr>
+        <a:xfrm>
+          <a:off x="0" y="0"/>
+          <a:ext cx="0" cy="0"/>
+          <a:chOff x="0" y="0"/>
+          <a:chExt cx="0" cy="0"/>
+        </a:xfrm>
+      </p:grpSpPr>
+      <p:sp>
+        <p:nvSpPr>
+          <p:cNvPr id="2" name="Title 1">
+            <a:extLst>
+              <a:ext uri="{FF2B5EF4-FFF2-40B4-BE49-F238E27FC236}">
+                <a16:creationId xmlns:a16="http://schemas.microsoft.com/office/drawing/2014/main" id="{8EBE87F1-7AAA-4F4B-AE8C-D445F7DB0A20}"/>
+              </a:ext>
+            </a:extLst>
+          </p:cNvPr>
+          <p:cNvSpPr>
+            <a:spLocks noGrp="1"/>
+          </p:cNvSpPr>
+          <p:nvPr>
+            <p:ph type="title"/>
+          </p:nvPr>
+        </p:nvSpPr>
+        <p:spPr/>
+        <p:txBody>
+          <a:bodyPr/>
+          <a:lstStyle/>
+          <a:p>
+            <a:r>
+              <a:rPr lang="en-US" dirty="0"/>
+              <a:t>Variations of this method</a:t>
+            </a:r>
+          </a:p>
+        </p:txBody>
+      </p:sp>
+      <p:sp>
+        <p:nvSpPr>
+          <p:cNvPr id="3" name="Content Placeholder 2">
+            <a:extLst>
+              <a:ext uri="{FF2B5EF4-FFF2-40B4-BE49-F238E27FC236}">
+                <a16:creationId xmlns:a16="http://schemas.microsoft.com/office/drawing/2014/main" id="{17B115A7-4937-4C3B-A318-67FD10D9816C}"/>
+              </a:ext>
+            </a:extLst>
+          </p:cNvPr>
+          <p:cNvSpPr>
+            <a:spLocks noGrp="1"/>
+          </p:cNvSpPr>
+          <p:nvPr>
+            <p:ph idx="1"/>
+          </p:nvPr>
+        </p:nvSpPr>
+        <p:spPr/>
+        <p:txBody>
+          <a:bodyPr/>
+          <a:lstStyle/>
+          <a:p>
+            <a:r>
+              <a:rPr lang="en-US" dirty="0"/>
+              <a:t>What if each Least Significant Bit represented a black pixel or a white pixel? You could hide black and white photos in the LSB</a:t>
+            </a:r>
+          </a:p>
+          <a:p>
+            <a:r>
+              <a:rPr lang="en-US" dirty="0"/>
+              <a:t>What if we only hid it in the LSB of the RED pixels? Or green? (This is called a bit plane)</a:t>
+            </a:r>
+          </a:p>
+          <a:p>
+            <a:r>
+              <a:rPr lang="en-US" dirty="0"/>
+              <a:t>What if we used the TWO Least Significant Bits, instead of one? The change in color is more likely to be noticed, but we can fit more data in</a:t>
+            </a:r>
+          </a:p>
+        </p:txBody>
+      </p:sp>
+    </p:spTree>
+    <p:extLst>
+      <p:ext uri="{BB962C8B-B14F-4D97-AF65-F5344CB8AC3E}">
+        <p14:creationId xmlns:p14="http://schemas.microsoft.com/office/powerpoint/2010/main" val="1988489248"/>
+      </p:ext>
+    </p:extLst>
+  </p:cSld>
+  <p:clrMapOvr>
+    <a:masterClrMapping/>
+  </p:clrMapOvr>
+</p:sld>
+</file>
+
+<file path=ppt/slides/slide12.xml><?xml version="1.0" encoding="utf-8"?>
+<p:sld xmlns:a="http://schemas.openxmlformats.org/drawingml/2006/main" xmlns:r="http://schemas.openxmlformats.org/officeDocument/2006/relationships" xmlns:p="http://schemas.openxmlformats.org/presentationml/2006/main">
+  <p:cSld>
+    <p:spTree>
+      <p:nvGrpSpPr>
+        <p:cNvPr id="1" name=""/>
+        <p:cNvGrpSpPr/>
+        <p:nvPr/>
+      </p:nvGrpSpPr>
+      <p:grpSpPr>
+        <a:xfrm>
+          <a:off x="0" y="0"/>
+          <a:ext cx="0" cy="0"/>
+          <a:chOff x="0" y="0"/>
+          <a:chExt cx="0" cy="0"/>
+        </a:xfrm>
+      </p:grpSpPr>
+      <p:sp>
+        <p:nvSpPr>
           <p:cNvPr id="2" name="Title 1">
             <a:extLst>
               <a:ext uri="{FF2B5EF4-FFF2-40B4-BE49-F238E27FC236}">
@@ -7431,10 +7663,10 @@
       </p:grpSpPr>
       <p:sp>
         <p:nvSpPr>
-          <p:cNvPr id="2" name="Title 1">
+          <p:cNvPr id="8" name="Title 7">
             <a:extLst>
               <a:ext uri="{FF2B5EF4-FFF2-40B4-BE49-F238E27FC236}">
-                <a16:creationId xmlns:a16="http://schemas.microsoft.com/office/drawing/2014/main" id="{8EBE87F1-7AAA-4F4B-AE8C-D445F7DB0A20}"/>
+                <a16:creationId xmlns:a16="http://schemas.microsoft.com/office/drawing/2014/main" id="{9EC85EB6-198B-4555-928E-F07D08066D6C}"/>
               </a:ext>
             </a:extLst>
           </p:cNvPr>
@@ -7452,55 +7684,85 @@
           <a:p>
             <a:r>
               <a:rPr lang="en-US" dirty="0"/>
-              <a:t>Variations of this method</a:t>
-            </a:r>
-          </a:p>
-        </p:txBody>
-      </p:sp>
-      <p:sp>
-        <p:nvSpPr>
-          <p:cNvPr id="3" name="Content Placeholder 2">
+              <a:t>Before lsb data encoding</a:t>
+            </a:r>
+          </a:p>
+        </p:txBody>
+      </p:sp>
+      <p:pic>
+        <p:nvPicPr>
+          <p:cNvPr id="14" name="Content Placeholder 13" descr="A city skyline at night&#10;&#10;Description automatically generated with medium confidence">
             <a:extLst>
               <a:ext uri="{FF2B5EF4-FFF2-40B4-BE49-F238E27FC236}">
-                <a16:creationId xmlns:a16="http://schemas.microsoft.com/office/drawing/2014/main" id="{17B115A7-4937-4C3B-A318-67FD10D9816C}"/>
+                <a16:creationId xmlns:a16="http://schemas.microsoft.com/office/drawing/2014/main" id="{7AB0C4E9-7F7C-42C6-82D7-668191F2AE3C}"/>
               </a:ext>
             </a:extLst>
           </p:cNvPr>
-          <p:cNvSpPr>
-            <a:spLocks noGrp="1"/>
-          </p:cNvSpPr>
-          <p:nvPr>
-            <p:ph idx="1"/>
-          </p:nvPr>
-        </p:nvSpPr>
-        <p:spPr/>
-        <p:txBody>
-          <a:bodyPr/>
-          <a:lstStyle/>
-          <a:p>
-            <a:r>
-              <a:rPr lang="en-US" dirty="0"/>
-              <a:t>What if each Least Significant Bit represented a black pixel or a white pixel? You could hide black and white photos in the LSB</a:t>
-            </a:r>
-          </a:p>
-          <a:p>
-            <a:r>
-              <a:rPr lang="en-US" dirty="0"/>
-              <a:t>What if we only hid it in the LSB of the RED pixels? Or green? (This is called a bit plane)</a:t>
-            </a:r>
-          </a:p>
-          <a:p>
-            <a:r>
-              <a:rPr lang="en-US" dirty="0"/>
-              <a:t>What if we used the TWO Least Significant Bits, instead of one? The change in color is more likely to be noticed, but we can fit more data in</a:t>
-            </a:r>
-          </a:p>
-        </p:txBody>
-      </p:sp>
+          <p:cNvPicPr>
+            <a:picLocks noGrp="1" noChangeAspect="1"/>
+          </p:cNvPicPr>
+          <p:nvPr>
+            <p:ph sz="half" idx="1"/>
+          </p:nvPr>
+        </p:nvPicPr>
+        <p:blipFill>
+          <a:blip r:embed="rId2">
+            <a:extLst>
+              <a:ext uri="{28A0092B-C50C-407E-A947-70E740481C1C}">
+                <a14:useLocalDpi xmlns:a14="http://schemas.microsoft.com/office/drawing/2010/main" val="0"/>
+              </a:ext>
+            </a:extLst>
+          </a:blip>
+          <a:stretch>
+            <a:fillRect/>
+          </a:stretch>
+        </p:blipFill>
+        <p:spPr>
+          <a:xfrm>
+            <a:off x="290039" y="2920483"/>
+            <a:ext cx="6730556" cy="2547256"/>
+          </a:xfrm>
+        </p:spPr>
+      </p:pic>
+      <p:pic>
+        <p:nvPicPr>
+          <p:cNvPr id="12" name="Content Placeholder 11" descr="Table&#10;&#10;Description automatically generated with low confidence">
+            <a:extLst>
+              <a:ext uri="{FF2B5EF4-FFF2-40B4-BE49-F238E27FC236}">
+                <a16:creationId xmlns:a16="http://schemas.microsoft.com/office/drawing/2014/main" id="{31D9B7DB-EE77-4CB0-8FC8-7353A0E2DEC1}"/>
+              </a:ext>
+            </a:extLst>
+          </p:cNvPr>
+          <p:cNvPicPr>
+            <a:picLocks noGrp="1" noChangeAspect="1"/>
+          </p:cNvPicPr>
+          <p:nvPr>
+            <p:ph sz="half" idx="2"/>
+          </p:nvPr>
+        </p:nvPicPr>
+        <p:blipFill>
+          <a:blip r:embed="rId3">
+            <a:extLst>
+              <a:ext uri="{28A0092B-C50C-407E-A947-70E740481C1C}">
+                <a14:useLocalDpi xmlns:a14="http://schemas.microsoft.com/office/drawing/2010/main" val="0"/>
+              </a:ext>
+            </a:extLst>
+          </a:blip>
+          <a:stretch>
+            <a:fillRect/>
+          </a:stretch>
+        </p:blipFill>
+        <p:spPr>
+          <a:xfrm>
+            <a:off x="7240557" y="870029"/>
+            <a:ext cx="4745386" cy="4955108"/>
+          </a:xfrm>
+        </p:spPr>
+      </p:pic>
     </p:spTree>
     <p:extLst>
       <p:ext uri="{BB962C8B-B14F-4D97-AF65-F5344CB8AC3E}">
-        <p14:creationId xmlns:p14="http://schemas.microsoft.com/office/powerpoint/2010/main" val="1988489248"/>
+        <p14:creationId xmlns:p14="http://schemas.microsoft.com/office/powerpoint/2010/main" val="2511020960"/>
       </p:ext>
     </p:extLst>
   </p:cSld>

</xml_diff>